<commit_message>
#22 update ER diagram
</commit_message>
<xml_diff>
--- a/document/ER-DIAGRAM.pptx
+++ b/document/ER-DIAGRAM.pptx
@@ -242,7 +242,7 @@
           <a:p>
             <a:fld id="{28BE630F-C39C-4DB9-8258-0B48CA067079}" type="datetimeFigureOut">
               <a:rPr lang="en-US" smtClean="0"/>
-              <a:t>12/17/2021</a:t>
+              <a:t>12/24/2021</a:t>
             </a:fld>
             <a:endParaRPr lang="en-US"/>
           </a:p>
@@ -410,7 +410,7 @@
           <a:p>
             <a:fld id="{28BE630F-C39C-4DB9-8258-0B48CA067079}" type="datetimeFigureOut">
               <a:rPr lang="en-US" smtClean="0"/>
-              <a:t>12/17/2021</a:t>
+              <a:t>12/24/2021</a:t>
             </a:fld>
             <a:endParaRPr lang="en-US"/>
           </a:p>
@@ -588,7 +588,7 @@
           <a:p>
             <a:fld id="{28BE630F-C39C-4DB9-8258-0B48CA067079}" type="datetimeFigureOut">
               <a:rPr lang="en-US" smtClean="0"/>
-              <a:t>12/17/2021</a:t>
+              <a:t>12/24/2021</a:t>
             </a:fld>
             <a:endParaRPr lang="en-US"/>
           </a:p>
@@ -756,7 +756,7 @@
           <a:p>
             <a:fld id="{28BE630F-C39C-4DB9-8258-0B48CA067079}" type="datetimeFigureOut">
               <a:rPr lang="en-US" smtClean="0"/>
-              <a:t>12/17/2021</a:t>
+              <a:t>12/24/2021</a:t>
             </a:fld>
             <a:endParaRPr lang="en-US"/>
           </a:p>
@@ -1001,7 +1001,7 @@
           <a:p>
             <a:fld id="{28BE630F-C39C-4DB9-8258-0B48CA067079}" type="datetimeFigureOut">
               <a:rPr lang="en-US" smtClean="0"/>
-              <a:t>12/17/2021</a:t>
+              <a:t>12/24/2021</a:t>
             </a:fld>
             <a:endParaRPr lang="en-US"/>
           </a:p>
@@ -1230,7 +1230,7 @@
           <a:p>
             <a:fld id="{28BE630F-C39C-4DB9-8258-0B48CA067079}" type="datetimeFigureOut">
               <a:rPr lang="en-US" smtClean="0"/>
-              <a:t>12/17/2021</a:t>
+              <a:t>12/24/2021</a:t>
             </a:fld>
             <a:endParaRPr lang="en-US"/>
           </a:p>
@@ -1594,7 +1594,7 @@
           <a:p>
             <a:fld id="{28BE630F-C39C-4DB9-8258-0B48CA067079}" type="datetimeFigureOut">
               <a:rPr lang="en-US" smtClean="0"/>
-              <a:t>12/17/2021</a:t>
+              <a:t>12/24/2021</a:t>
             </a:fld>
             <a:endParaRPr lang="en-US"/>
           </a:p>
@@ -1711,7 +1711,7 @@
           <a:p>
             <a:fld id="{28BE630F-C39C-4DB9-8258-0B48CA067079}" type="datetimeFigureOut">
               <a:rPr lang="en-US" smtClean="0"/>
-              <a:t>12/17/2021</a:t>
+              <a:t>12/24/2021</a:t>
             </a:fld>
             <a:endParaRPr lang="en-US"/>
           </a:p>
@@ -1806,7 +1806,7 @@
           <a:p>
             <a:fld id="{28BE630F-C39C-4DB9-8258-0B48CA067079}" type="datetimeFigureOut">
               <a:rPr lang="en-US" smtClean="0"/>
-              <a:t>12/17/2021</a:t>
+              <a:t>12/24/2021</a:t>
             </a:fld>
             <a:endParaRPr lang="en-US"/>
           </a:p>
@@ -2081,7 +2081,7 @@
           <a:p>
             <a:fld id="{28BE630F-C39C-4DB9-8258-0B48CA067079}" type="datetimeFigureOut">
               <a:rPr lang="en-US" smtClean="0"/>
-              <a:t>12/17/2021</a:t>
+              <a:t>12/24/2021</a:t>
             </a:fld>
             <a:endParaRPr lang="en-US"/>
           </a:p>
@@ -2333,7 +2333,7 @@
           <a:p>
             <a:fld id="{28BE630F-C39C-4DB9-8258-0B48CA067079}" type="datetimeFigureOut">
               <a:rPr lang="en-US" smtClean="0"/>
-              <a:t>12/17/2021</a:t>
+              <a:t>12/24/2021</a:t>
             </a:fld>
             <a:endParaRPr lang="en-US"/>
           </a:p>
@@ -2544,7 +2544,7 @@
           <a:p>
             <a:fld id="{28BE630F-C39C-4DB9-8258-0B48CA067079}" type="datetimeFigureOut">
               <a:rPr lang="en-US" smtClean="0"/>
-              <a:t>12/17/2021</a:t>
+              <a:t>12/24/2021</a:t>
             </a:fld>
             <a:endParaRPr lang="en-US"/>
           </a:p>
@@ -3206,10 +3206,10 @@
       </p:grpSpPr>
       <p:graphicFrame>
         <p:nvGraphicFramePr>
-          <p:cNvPr id="115" name="Table 114">
+          <p:cNvPr id="4" name="Table 3">
             <a:extLst>
               <a:ext uri="{FF2B5EF4-FFF2-40B4-BE49-F238E27FC236}">
-                <a16:creationId xmlns:a16="http://schemas.microsoft.com/office/drawing/2014/main" id="{416527B2-C9C6-4B85-A9C2-0F1D7512288D}"/>
+                <a16:creationId xmlns:a16="http://schemas.microsoft.com/office/drawing/2014/main" id="{216E6A9C-EA4F-4C22-A4AE-B5712F7AC386}"/>
               </a:ext>
             </a:extLst>
           </p:cNvPr>
@@ -3219,14 +3219,14 @@
           <p:nvPr>
             <p:extLst>
               <p:ext uri="{D42A27DB-BD31-4B8C-83A1-F6EECF244321}">
-                <p14:modId xmlns:p14="http://schemas.microsoft.com/office/powerpoint/2010/main" val="1346231827"/>
+                <p14:modId xmlns:p14="http://schemas.microsoft.com/office/powerpoint/2010/main" val="112772096"/>
               </p:ext>
             </p:extLst>
           </p:nvPr>
         </p:nvGraphicFramePr>
         <p:xfrm>
-          <a:off x="2085278" y="2088579"/>
-          <a:ext cx="2015085" cy="1553781"/>
+          <a:off x="1784134" y="3418204"/>
+          <a:ext cx="2051873" cy="1980501"/>
         </p:xfrm>
         <a:graphic>
           <a:graphicData uri="http://schemas.openxmlformats.org/drawingml/2006/table">
@@ -3235,7 +3235,7 @@
                 <a:tableStyleId>{5C22544A-7EE6-4342-B048-85BDC9FD1C3A}</a:tableStyleId>
               </a:tblPr>
               <a:tblGrid>
-                <a:gridCol w="358817">
+                <a:gridCol w="395605">
                   <a:extLst>
                     <a:ext uri="{9D8B030D-6E8A-4147-A177-3AD203B41FA5}">
                       <a16:colId xmlns:a16="http://schemas.microsoft.com/office/drawing/2014/main" val="3052149917"/>
@@ -3297,6 +3297,21 @@
                     <a:p>
                       <a:endParaRPr lang="en-US" sz="1600" dirty="0"/>
                     </a:p>
+                    <a:p>
+                      <a:endParaRPr lang="en-US" sz="1600" dirty="0"/>
+                    </a:p>
+                    <a:p>
+                      <a:endParaRPr lang="en-US" sz="1200" dirty="0"/>
+                    </a:p>
+                    <a:p>
+                      <a:endParaRPr lang="en-US" sz="1200" dirty="0"/>
+                    </a:p>
+                    <a:p>
+                      <a:r>
+                        <a:rPr lang="en-US" sz="1200" dirty="0"/>
+                        <a:t>FK</a:t>
+                      </a:r>
+                    </a:p>
                   </a:txBody>
                   <a:tcPr/>
                 </a:tc>
@@ -3325,7 +3340,7 @@
                             <a:schemeClr val="tx1"/>
                           </a:solidFill>
                         </a:rPr>
-                        <a:t>name </a:t>
+                        <a:t>username </a:t>
                       </a:r>
                       <a:r>
                         <a:rPr lang="en-US" sz="1400" dirty="0">
@@ -3388,6 +3403,45 @@
                           </a:solidFill>
                         </a:rPr>
                         <a:t>string</a:t>
+                      </a:r>
+                    </a:p>
+                    <a:p>
+                      <a:r>
+                        <a:rPr lang="en-US" sz="1400" dirty="0">
+                          <a:solidFill>
+                            <a:schemeClr val="tx1"/>
+                          </a:solidFill>
+                        </a:rPr>
+                        <a:t>picture</a:t>
+                      </a:r>
+                      <a:r>
+                        <a:rPr lang="en-US" sz="1400" dirty="0">
+                          <a:solidFill>
+                            <a:srgbClr val="FF0000"/>
+                          </a:solidFill>
+                        </a:rPr>
+                        <a:t> string</a:t>
+                      </a:r>
+                    </a:p>
+                    <a:p>
+                      <a:r>
+                        <a:rPr lang="en-US" sz="1400" dirty="0">
+                          <a:solidFill>
+                            <a:schemeClr val="tx1">
+                              <a:lumMod val="95000"/>
+                              <a:lumOff val="5000"/>
+                            </a:schemeClr>
+                          </a:solidFill>
+                        </a:rPr>
+                        <a:t>student_id </a:t>
+                      </a:r>
+                      <a:r>
+                        <a:rPr lang="en-US" sz="1400" dirty="0">
+                          <a:solidFill>
+                            <a:srgbClr val="FF0000"/>
+                          </a:solidFill>
+                        </a:rPr>
+                        <a:t>int</a:t>
                       </a:r>
                     </a:p>
                   </a:txBody>
@@ -3405,10 +3459,10 @@
       </p:graphicFrame>
       <p:graphicFrame>
         <p:nvGraphicFramePr>
-          <p:cNvPr id="15" name="Table 14">
+          <p:cNvPr id="5" name="Table 4">
             <a:extLst>
               <a:ext uri="{FF2B5EF4-FFF2-40B4-BE49-F238E27FC236}">
-                <a16:creationId xmlns:a16="http://schemas.microsoft.com/office/drawing/2014/main" id="{A1A9ADB5-E74D-4DC2-99AC-80E9BB29EFB4}"/>
+                <a16:creationId xmlns:a16="http://schemas.microsoft.com/office/drawing/2014/main" id="{E16BBC88-9D78-4F8F-BE74-186AB3A1F6CB}"/>
               </a:ext>
             </a:extLst>
           </p:cNvPr>
@@ -3418,13 +3472,13 @@
           <p:nvPr>
             <p:extLst>
               <p:ext uri="{D42A27DB-BD31-4B8C-83A1-F6EECF244321}">
-                <p14:modId xmlns:p14="http://schemas.microsoft.com/office/powerpoint/2010/main" val="3149873991"/>
+                <p14:modId xmlns:p14="http://schemas.microsoft.com/office/powerpoint/2010/main" val="3325817260"/>
               </p:ext>
             </p:extLst>
           </p:nvPr>
         </p:nvGraphicFramePr>
         <p:xfrm>
-          <a:off x="5088457" y="1875218"/>
+          <a:off x="5976067" y="3429000"/>
           <a:ext cx="2015085" cy="1980501"/>
         </p:xfrm>
         <a:graphic>
@@ -3572,6 +3626,41 @@
                       </a:r>
                     </a:p>
                     <a:p>
+                      <a:pPr marL="0" marR="0" lvl="0" indent="0" algn="l" defTabSz="914400" rtl="0" eaLnBrk="1" fontAlgn="auto" latinLnBrk="0" hangingPunct="1">
+                        <a:lnSpc>
+                          <a:spcPct val="100000"/>
+                        </a:lnSpc>
+                        <a:spcBef>
+                          <a:spcPts val="0"/>
+                        </a:spcBef>
+                        <a:spcAft>
+                          <a:spcPts val="0"/>
+                        </a:spcAft>
+                        <a:buClrTx/>
+                        <a:buSzTx/>
+                        <a:buFontTx/>
+                        <a:buNone/>
+                        <a:tabLst/>
+                        <a:defRPr/>
+                      </a:pPr>
+                      <a:r>
+                        <a:rPr lang="en-US" sz="1400" dirty="0">
+                          <a:solidFill>
+                            <a:schemeClr val="tx1"/>
+                          </a:solidFill>
+                        </a:rPr>
+                        <a:t>gender</a:t>
+                      </a:r>
+                      <a:r>
+                        <a:rPr lang="en-US" sz="1400" dirty="0">
+                          <a:solidFill>
+                            <a:srgbClr val="FF0000"/>
+                          </a:solidFill>
+                        </a:rPr>
+                        <a:t> string</a:t>
+                      </a:r>
+                    </a:p>
+                    <a:p>
                       <a:r>
                         <a:rPr lang="en-US" sz="1400" dirty="0">
                           <a:solidFill>
@@ -3597,24 +3686,6 @@
                           </a:solidFill>
                         </a:rPr>
                         <a:t>picture</a:t>
-                      </a:r>
-                      <a:r>
-                        <a:rPr lang="en-US" sz="1400" dirty="0">
-                          <a:solidFill>
-                            <a:srgbClr val="FF0000"/>
-                          </a:solidFill>
-                        </a:rPr>
-                        <a:t> string</a:t>
-                      </a:r>
-                    </a:p>
-                    <a:p>
-                      <a:r>
-                        <a:rPr lang="en-US" sz="1400" dirty="0">
-                          <a:solidFill>
-                            <a:schemeClr val="tx1"/>
-                          </a:solidFill>
-                        </a:rPr>
-                        <a:t>gender</a:t>
                       </a:r>
                       <a:r>
                         <a:rPr lang="en-US" sz="1400" dirty="0">
@@ -3638,6 +3709,1210 @@
           </a:graphicData>
         </a:graphic>
       </p:graphicFrame>
+      <p:graphicFrame>
+        <p:nvGraphicFramePr>
+          <p:cNvPr id="6" name="Table 5">
+            <a:extLst>
+              <a:ext uri="{FF2B5EF4-FFF2-40B4-BE49-F238E27FC236}">
+                <a16:creationId xmlns:a16="http://schemas.microsoft.com/office/drawing/2014/main" id="{ADB12951-6EF6-4FD9-A9E0-4B34EA65F63A}"/>
+              </a:ext>
+            </a:extLst>
+          </p:cNvPr>
+          <p:cNvGraphicFramePr>
+            <a:graphicFrameLocks noGrp="1"/>
+          </p:cNvGraphicFramePr>
+          <p:nvPr>
+            <p:extLst>
+              <p:ext uri="{D42A27DB-BD31-4B8C-83A1-F6EECF244321}">
+                <p14:modId xmlns:p14="http://schemas.microsoft.com/office/powerpoint/2010/main" val="2529007443"/>
+              </p:ext>
+            </p:extLst>
+          </p:nvPr>
+        </p:nvGraphicFramePr>
+        <p:xfrm>
+          <a:off x="5998556" y="458248"/>
+          <a:ext cx="2357026" cy="1980501"/>
+        </p:xfrm>
+        <a:graphic>
+          <a:graphicData uri="http://schemas.openxmlformats.org/drawingml/2006/table">
+            <a:tbl>
+              <a:tblPr firstRow="1" bandRow="1">
+                <a:tableStyleId>{5C22544A-7EE6-4342-B048-85BDC9FD1C3A}</a:tableStyleId>
+              </a:tblPr>
+              <a:tblGrid>
+                <a:gridCol w="395605">
+                  <a:extLst>
+                    <a:ext uri="{9D8B030D-6E8A-4147-A177-3AD203B41FA5}">
+                      <a16:colId xmlns:a16="http://schemas.microsoft.com/office/drawing/2014/main" val="3052149917"/>
+                    </a:ext>
+                  </a:extLst>
+                </a:gridCol>
+                <a:gridCol w="1961421">
+                  <a:extLst>
+                    <a:ext uri="{9D8B030D-6E8A-4147-A177-3AD203B41FA5}">
+                      <a16:colId xmlns:a16="http://schemas.microsoft.com/office/drawing/2014/main" val="849940379"/>
+                    </a:ext>
+                  </a:extLst>
+                </a:gridCol>
+              </a:tblGrid>
+              <a:tr h="395541">
+                <a:tc gridSpan="2">
+                  <a:txBody>
+                    <a:bodyPr/>
+                    <a:lstStyle/>
+                    <a:p>
+                      <a:r>
+                        <a:rPr lang="en-US" dirty="0"/>
+                        <a:t>     permission  </a:t>
+                      </a:r>
+                    </a:p>
+                  </a:txBody>
+                  <a:tcPr/>
+                </a:tc>
+                <a:tc hMerge="1">
+                  <a:txBody>
+                    <a:bodyPr/>
+                    <a:lstStyle/>
+                    <a:p>
+                      <a:endParaRPr lang="en-US" dirty="0"/>
+                    </a:p>
+                  </a:txBody>
+                  <a:tcPr/>
+                </a:tc>
+                <a:extLst>
+                  <a:ext uri="{0D108BD9-81ED-4DB2-BD59-A6C34878D82A}">
+                    <a16:rowId xmlns:a16="http://schemas.microsoft.com/office/drawing/2014/main" val="1300100705"/>
+                  </a:ext>
+                </a:extLst>
+              </a:tr>
+              <a:tr h="395541">
+                <a:tc>
+                  <a:txBody>
+                    <a:bodyPr/>
+                    <a:lstStyle/>
+                    <a:p>
+                      <a:r>
+                        <a:rPr lang="en-US" sz="1400" dirty="0"/>
+                        <a:t>Pk</a:t>
+                      </a:r>
+                    </a:p>
+                    <a:p>
+                      <a:r>
+                        <a:rPr lang="en-US" sz="1400" dirty="0"/>
+                        <a:t>FK</a:t>
+                      </a:r>
+                    </a:p>
+                  </a:txBody>
+                  <a:tcPr/>
+                </a:tc>
+                <a:tc>
+                  <a:txBody>
+                    <a:bodyPr/>
+                    <a:lstStyle/>
+                    <a:p>
+                      <a:r>
+                        <a:rPr lang="en-US" sz="1400" dirty="0"/>
+                        <a:t>id  </a:t>
+                      </a:r>
+                      <a:r>
+                        <a:rPr lang="en-US" sz="1400" dirty="0">
+                          <a:solidFill>
+                            <a:srgbClr val="FF0000"/>
+                          </a:solidFill>
+                        </a:rPr>
+                        <a:t>int</a:t>
+                      </a:r>
+                    </a:p>
+                    <a:p>
+                      <a:pPr marL="0" marR="0" lvl="0" indent="0" algn="l" defTabSz="914400" rtl="0" eaLnBrk="1" fontAlgn="auto" latinLnBrk="0" hangingPunct="1">
+                        <a:lnSpc>
+                          <a:spcPct val="100000"/>
+                        </a:lnSpc>
+                        <a:spcBef>
+                          <a:spcPts val="0"/>
+                        </a:spcBef>
+                        <a:spcAft>
+                          <a:spcPts val="0"/>
+                        </a:spcAft>
+                        <a:buClrTx/>
+                        <a:buSzTx/>
+                        <a:buFontTx/>
+                        <a:buNone/>
+                        <a:tabLst/>
+                        <a:defRPr/>
+                      </a:pPr>
+                      <a:r>
+                        <a:rPr lang="en-US" sz="1400" dirty="0">
+                          <a:solidFill>
+                            <a:schemeClr val="tx1"/>
+                          </a:solidFill>
+                        </a:rPr>
+                        <a:t>student_id </a:t>
+                      </a:r>
+                      <a:r>
+                        <a:rPr lang="en-US" sz="1400" dirty="0">
+                          <a:solidFill>
+                            <a:srgbClr val="FF0000"/>
+                          </a:solidFill>
+                        </a:rPr>
+                        <a:t>int</a:t>
+                      </a:r>
+                    </a:p>
+                    <a:p>
+                      <a:r>
+                        <a:rPr lang="en-US" sz="1400" dirty="0">
+                          <a:solidFill>
+                            <a:schemeClr val="tx1"/>
+                          </a:solidFill>
+                        </a:rPr>
+                        <a:t>class </a:t>
+                      </a:r>
+                      <a:r>
+                        <a:rPr lang="en-US" sz="1400" dirty="0">
+                          <a:solidFill>
+                            <a:srgbClr val="FF0000"/>
+                          </a:solidFill>
+                        </a:rPr>
+                        <a:t>string</a:t>
+                      </a:r>
+                    </a:p>
+                    <a:p>
+                      <a:r>
+                        <a:rPr lang="en-US" sz="1400" dirty="0" err="1">
+                          <a:solidFill>
+                            <a:schemeClr val="tx1"/>
+                          </a:solidFill>
+                        </a:rPr>
+                        <a:t>startAt</a:t>
+                      </a:r>
+                      <a:r>
+                        <a:rPr lang="en-US" sz="1400" dirty="0">
+                          <a:solidFill>
+                            <a:schemeClr val="tx1"/>
+                          </a:solidFill>
+                        </a:rPr>
+                        <a:t> </a:t>
+                      </a:r>
+                      <a:r>
+                        <a:rPr lang="en-US" sz="1400" dirty="0">
+                          <a:solidFill>
+                            <a:srgbClr val="FF0000"/>
+                          </a:solidFill>
+                        </a:rPr>
+                        <a:t>string</a:t>
+                      </a:r>
+                    </a:p>
+                    <a:p>
+                      <a:r>
+                        <a:rPr lang="en-US" sz="1400" dirty="0" err="1">
+                          <a:solidFill>
+                            <a:schemeClr val="tx1"/>
+                          </a:solidFill>
+                        </a:rPr>
+                        <a:t>endAt</a:t>
+                      </a:r>
+                      <a:r>
+                        <a:rPr lang="en-US" sz="1400" dirty="0">
+                          <a:solidFill>
+                            <a:schemeClr val="tx1"/>
+                          </a:solidFill>
+                        </a:rPr>
+                        <a:t> </a:t>
+                      </a:r>
+                      <a:r>
+                        <a:rPr lang="en-US" sz="1400" dirty="0">
+                          <a:solidFill>
+                            <a:srgbClr val="FF0000"/>
+                          </a:solidFill>
+                        </a:rPr>
+                        <a:t>string</a:t>
+                      </a:r>
+                      <a:endParaRPr lang="en-US" sz="1400" dirty="0">
+                        <a:solidFill>
+                          <a:schemeClr val="tx1"/>
+                        </a:solidFill>
+                      </a:endParaRPr>
+                    </a:p>
+                    <a:p>
+                      <a:r>
+                        <a:rPr lang="en-US" sz="1400" dirty="0">
+                          <a:solidFill>
+                            <a:schemeClr val="tx1"/>
+                          </a:solidFill>
+                        </a:rPr>
+                        <a:t>type </a:t>
+                      </a:r>
+                      <a:r>
+                        <a:rPr lang="en-US" sz="1400" dirty="0">
+                          <a:solidFill>
+                            <a:srgbClr val="FF0000"/>
+                          </a:solidFill>
+                        </a:rPr>
+                        <a:t>string</a:t>
+                      </a:r>
+                    </a:p>
+                    <a:p>
+                      <a:r>
+                        <a:rPr lang="en-US" sz="1400" dirty="0">
+                          <a:solidFill>
+                            <a:schemeClr val="tx1"/>
+                          </a:solidFill>
+                        </a:rPr>
+                        <a:t>description </a:t>
+                      </a:r>
+                      <a:r>
+                        <a:rPr lang="en-US" sz="1400" dirty="0">
+                          <a:solidFill>
+                            <a:srgbClr val="FF0000"/>
+                          </a:solidFill>
+                        </a:rPr>
+                        <a:t>string</a:t>
+                      </a:r>
+                    </a:p>
+                  </a:txBody>
+                  <a:tcPr/>
+                </a:tc>
+                <a:extLst>
+                  <a:ext uri="{0D108BD9-81ED-4DB2-BD59-A6C34878D82A}">
+                    <a16:rowId xmlns:a16="http://schemas.microsoft.com/office/drawing/2014/main" val="4232249410"/>
+                  </a:ext>
+                </a:extLst>
+              </a:tr>
+            </a:tbl>
+          </a:graphicData>
+        </a:graphic>
+      </p:graphicFrame>
+      <p:graphicFrame>
+        <p:nvGraphicFramePr>
+          <p:cNvPr id="7" name="Table 6">
+            <a:extLst>
+              <a:ext uri="{FF2B5EF4-FFF2-40B4-BE49-F238E27FC236}">
+                <a16:creationId xmlns:a16="http://schemas.microsoft.com/office/drawing/2014/main" id="{E0C810B0-123B-4AB6-B0FC-C91BB289CA9D}"/>
+              </a:ext>
+            </a:extLst>
+          </p:cNvPr>
+          <p:cNvGraphicFramePr>
+            <a:graphicFrameLocks noGrp="1"/>
+          </p:cNvGraphicFramePr>
+          <p:nvPr>
+            <p:extLst>
+              <p:ext uri="{D42A27DB-BD31-4B8C-83A1-F6EECF244321}">
+                <p14:modId xmlns:p14="http://schemas.microsoft.com/office/powerpoint/2010/main" val="2533336286"/>
+              </p:ext>
+            </p:extLst>
+          </p:nvPr>
+        </p:nvGraphicFramePr>
+        <p:xfrm>
+          <a:off x="1670598" y="881367"/>
+          <a:ext cx="2461564" cy="1553781"/>
+        </p:xfrm>
+        <a:graphic>
+          <a:graphicData uri="http://schemas.openxmlformats.org/drawingml/2006/table">
+            <a:tbl>
+              <a:tblPr firstRow="1" bandRow="1">
+                <a:tableStyleId>{5C22544A-7EE6-4342-B048-85BDC9FD1C3A}</a:tableStyleId>
+              </a:tblPr>
+              <a:tblGrid>
+                <a:gridCol w="459285">
+                  <a:extLst>
+                    <a:ext uri="{9D8B030D-6E8A-4147-A177-3AD203B41FA5}">
+                      <a16:colId xmlns:a16="http://schemas.microsoft.com/office/drawing/2014/main" val="3052149917"/>
+                    </a:ext>
+                  </a:extLst>
+                </a:gridCol>
+                <a:gridCol w="2002279">
+                  <a:extLst>
+                    <a:ext uri="{9D8B030D-6E8A-4147-A177-3AD203B41FA5}">
+                      <a16:colId xmlns:a16="http://schemas.microsoft.com/office/drawing/2014/main" val="849940379"/>
+                    </a:ext>
+                  </a:extLst>
+                </a:gridCol>
+              </a:tblGrid>
+              <a:tr h="395541">
+                <a:tc gridSpan="2">
+                  <a:txBody>
+                    <a:bodyPr/>
+                    <a:lstStyle/>
+                    <a:p>
+                      <a:r>
+                        <a:rPr lang="en-US" dirty="0"/>
+                        <a:t>     disciple </a:t>
+                      </a:r>
+                    </a:p>
+                  </a:txBody>
+                  <a:tcPr/>
+                </a:tc>
+                <a:tc hMerge="1">
+                  <a:txBody>
+                    <a:bodyPr/>
+                    <a:lstStyle/>
+                    <a:p>
+                      <a:endParaRPr lang="en-US" dirty="0"/>
+                    </a:p>
+                  </a:txBody>
+                  <a:tcPr/>
+                </a:tc>
+                <a:extLst>
+                  <a:ext uri="{0D108BD9-81ED-4DB2-BD59-A6C34878D82A}">
+                    <a16:rowId xmlns:a16="http://schemas.microsoft.com/office/drawing/2014/main" val="1300100705"/>
+                  </a:ext>
+                </a:extLst>
+              </a:tr>
+              <a:tr h="395541">
+                <a:tc>
+                  <a:txBody>
+                    <a:bodyPr/>
+                    <a:lstStyle/>
+                    <a:p>
+                      <a:r>
+                        <a:rPr lang="en-US" sz="1400" dirty="0"/>
+                        <a:t>PK</a:t>
+                      </a:r>
+                    </a:p>
+                    <a:p>
+                      <a:pPr marL="0" marR="0" lvl="0" indent="0" algn="l" defTabSz="914400" rtl="0" eaLnBrk="1" fontAlgn="auto" latinLnBrk="0" hangingPunct="1">
+                        <a:lnSpc>
+                          <a:spcPct val="100000"/>
+                        </a:lnSpc>
+                        <a:spcBef>
+                          <a:spcPts val="0"/>
+                        </a:spcBef>
+                        <a:spcAft>
+                          <a:spcPts val="0"/>
+                        </a:spcAft>
+                        <a:buClrTx/>
+                        <a:buSzTx/>
+                        <a:buFontTx/>
+                        <a:buNone/>
+                        <a:tabLst/>
+                        <a:defRPr/>
+                      </a:pPr>
+                      <a:r>
+                        <a:rPr lang="en-US" sz="1400" dirty="0"/>
+                        <a:t>FK</a:t>
+                      </a:r>
+                    </a:p>
+                    <a:p>
+                      <a:endParaRPr lang="en-US" sz="1400" dirty="0"/>
+                    </a:p>
+                  </a:txBody>
+                  <a:tcPr/>
+                </a:tc>
+                <a:tc>
+                  <a:txBody>
+                    <a:bodyPr/>
+                    <a:lstStyle/>
+                    <a:p>
+                      <a:r>
+                        <a:rPr lang="en-US" sz="1400" dirty="0"/>
+                        <a:t>id  </a:t>
+                      </a:r>
+                      <a:r>
+                        <a:rPr lang="en-US" sz="1400" dirty="0">
+                          <a:solidFill>
+                            <a:srgbClr val="FF0000"/>
+                          </a:solidFill>
+                        </a:rPr>
+                        <a:t>int</a:t>
+                      </a:r>
+                    </a:p>
+                    <a:p>
+                      <a:pPr marL="0" marR="0" lvl="0" indent="0" algn="l" defTabSz="914400" rtl="0" eaLnBrk="1" fontAlgn="auto" latinLnBrk="0" hangingPunct="1">
+                        <a:lnSpc>
+                          <a:spcPct val="100000"/>
+                        </a:lnSpc>
+                        <a:spcBef>
+                          <a:spcPts val="0"/>
+                        </a:spcBef>
+                        <a:spcAft>
+                          <a:spcPts val="0"/>
+                        </a:spcAft>
+                        <a:buClrTx/>
+                        <a:buSzTx/>
+                        <a:buFontTx/>
+                        <a:buNone/>
+                        <a:tabLst/>
+                        <a:defRPr/>
+                      </a:pPr>
+                      <a:r>
+                        <a:rPr lang="en-US" sz="1400" dirty="0">
+                          <a:solidFill>
+                            <a:schemeClr val="tx1"/>
+                          </a:solidFill>
+                        </a:rPr>
+                        <a:t>student_id </a:t>
+                      </a:r>
+                      <a:r>
+                        <a:rPr lang="en-US" sz="1400" dirty="0">
+                          <a:solidFill>
+                            <a:srgbClr val="FF0000"/>
+                          </a:solidFill>
+                        </a:rPr>
+                        <a:t>int</a:t>
+                      </a:r>
+                    </a:p>
+                    <a:p>
+                      <a:r>
+                        <a:rPr lang="en-US" sz="1400" dirty="0">
+                          <a:solidFill>
+                            <a:schemeClr val="tx1"/>
+                          </a:solidFill>
+                        </a:rPr>
+                        <a:t>class </a:t>
+                      </a:r>
+                      <a:r>
+                        <a:rPr lang="en-US" sz="1400" dirty="0">
+                          <a:solidFill>
+                            <a:srgbClr val="FF0000"/>
+                          </a:solidFill>
+                        </a:rPr>
+                        <a:t>string</a:t>
+                      </a:r>
+                    </a:p>
+                    <a:p>
+                      <a:r>
+                        <a:rPr lang="en-US" sz="1400" dirty="0">
+                          <a:solidFill>
+                            <a:schemeClr val="tx1"/>
+                          </a:solidFill>
+                        </a:rPr>
+                        <a:t>type </a:t>
+                      </a:r>
+                      <a:r>
+                        <a:rPr lang="en-US" sz="1400" dirty="0">
+                          <a:solidFill>
+                            <a:srgbClr val="FF0000"/>
+                          </a:solidFill>
+                        </a:rPr>
+                        <a:t>string</a:t>
+                      </a:r>
+                    </a:p>
+                    <a:p>
+                      <a:r>
+                        <a:rPr lang="en-US" sz="1400" dirty="0">
+                          <a:solidFill>
+                            <a:schemeClr val="tx1"/>
+                          </a:solidFill>
+                        </a:rPr>
+                        <a:t>description </a:t>
+                      </a:r>
+                      <a:r>
+                        <a:rPr lang="en-US" sz="1400" dirty="0">
+                          <a:solidFill>
+                            <a:srgbClr val="FF0000"/>
+                          </a:solidFill>
+                        </a:rPr>
+                        <a:t>string</a:t>
+                      </a:r>
+                    </a:p>
+                  </a:txBody>
+                  <a:tcPr/>
+                </a:tc>
+                <a:extLst>
+                  <a:ext uri="{0D108BD9-81ED-4DB2-BD59-A6C34878D82A}">
+                    <a16:rowId xmlns:a16="http://schemas.microsoft.com/office/drawing/2014/main" val="4232249410"/>
+                  </a:ext>
+                </a:extLst>
+              </a:tr>
+            </a:tbl>
+          </a:graphicData>
+        </a:graphic>
+      </p:graphicFrame>
+      <p:cxnSp>
+        <p:nvCxnSpPr>
+          <p:cNvPr id="8" name="Straight Connector 7">
+            <a:extLst>
+              <a:ext uri="{FF2B5EF4-FFF2-40B4-BE49-F238E27FC236}">
+                <a16:creationId xmlns:a16="http://schemas.microsoft.com/office/drawing/2014/main" id="{AB2E2D5D-4C65-4974-8142-639F7DA2B174}"/>
+              </a:ext>
+            </a:extLst>
+          </p:cNvPr>
+          <p:cNvCxnSpPr>
+            <a:cxnSpLocks/>
+          </p:cNvCxnSpPr>
+          <p:nvPr/>
+        </p:nvCxnSpPr>
+        <p:spPr>
+          <a:xfrm>
+            <a:off x="4119283" y="1081825"/>
+            <a:ext cx="864842" cy="0"/>
+          </a:xfrm>
+          <a:prstGeom prst="line">
+            <a:avLst/>
+          </a:prstGeom>
+        </p:spPr>
+        <p:style>
+          <a:lnRef idx="1">
+            <a:schemeClr val="accent1"/>
+          </a:lnRef>
+          <a:fillRef idx="0">
+            <a:schemeClr val="accent1"/>
+          </a:fillRef>
+          <a:effectRef idx="0">
+            <a:schemeClr val="accent1"/>
+          </a:effectRef>
+          <a:fontRef idx="minor">
+            <a:schemeClr val="tx1"/>
+          </a:fontRef>
+        </p:style>
+      </p:cxnSp>
+      <p:cxnSp>
+        <p:nvCxnSpPr>
+          <p:cNvPr id="9" name="Straight Connector 8">
+            <a:extLst>
+              <a:ext uri="{FF2B5EF4-FFF2-40B4-BE49-F238E27FC236}">
+                <a16:creationId xmlns:a16="http://schemas.microsoft.com/office/drawing/2014/main" id="{D8281502-77D9-49EE-A931-37AC7A6D82F7}"/>
+              </a:ext>
+            </a:extLst>
+          </p:cNvPr>
+          <p:cNvCxnSpPr>
+            <a:cxnSpLocks/>
+          </p:cNvCxnSpPr>
+          <p:nvPr/>
+        </p:nvCxnSpPr>
+        <p:spPr>
+          <a:xfrm>
+            <a:off x="4984125" y="1068110"/>
+            <a:ext cx="0" cy="2550017"/>
+          </a:xfrm>
+          <a:prstGeom prst="line">
+            <a:avLst/>
+          </a:prstGeom>
+        </p:spPr>
+        <p:style>
+          <a:lnRef idx="1">
+            <a:schemeClr val="accent1"/>
+          </a:lnRef>
+          <a:fillRef idx="0">
+            <a:schemeClr val="accent1"/>
+          </a:fillRef>
+          <a:effectRef idx="0">
+            <a:schemeClr val="accent1"/>
+          </a:effectRef>
+          <a:fontRef idx="minor">
+            <a:schemeClr val="tx1"/>
+          </a:fontRef>
+        </p:style>
+      </p:cxnSp>
+      <p:cxnSp>
+        <p:nvCxnSpPr>
+          <p:cNvPr id="10" name="Straight Connector 9">
+            <a:extLst>
+              <a:ext uri="{FF2B5EF4-FFF2-40B4-BE49-F238E27FC236}">
+                <a16:creationId xmlns:a16="http://schemas.microsoft.com/office/drawing/2014/main" id="{B2EC5BB2-483F-4383-B78D-7EC111ADF6F8}"/>
+              </a:ext>
+            </a:extLst>
+          </p:cNvPr>
+          <p:cNvCxnSpPr>
+            <a:cxnSpLocks/>
+          </p:cNvCxnSpPr>
+          <p:nvPr/>
+        </p:nvCxnSpPr>
+        <p:spPr>
+          <a:xfrm>
+            <a:off x="4984125" y="3618127"/>
+            <a:ext cx="1014430" cy="0"/>
+          </a:xfrm>
+          <a:prstGeom prst="line">
+            <a:avLst/>
+          </a:prstGeom>
+        </p:spPr>
+        <p:style>
+          <a:lnRef idx="1">
+            <a:schemeClr val="accent1"/>
+          </a:lnRef>
+          <a:fillRef idx="0">
+            <a:schemeClr val="accent1"/>
+          </a:fillRef>
+          <a:effectRef idx="0">
+            <a:schemeClr val="accent1"/>
+          </a:effectRef>
+          <a:fontRef idx="minor">
+            <a:schemeClr val="tx1"/>
+          </a:fontRef>
+        </p:style>
+      </p:cxnSp>
+      <p:sp>
+        <p:nvSpPr>
+          <p:cNvPr id="11" name="TextBox 10">
+            <a:extLst>
+              <a:ext uri="{FF2B5EF4-FFF2-40B4-BE49-F238E27FC236}">
+                <a16:creationId xmlns:a16="http://schemas.microsoft.com/office/drawing/2014/main" id="{10016374-898A-4CF5-BB30-244935D4C898}"/>
+              </a:ext>
+            </a:extLst>
+          </p:cNvPr>
+          <p:cNvSpPr txBox="1"/>
+          <p:nvPr/>
+        </p:nvSpPr>
+        <p:spPr>
+          <a:xfrm>
+            <a:off x="4027412" y="881367"/>
+            <a:ext cx="512629" cy="373487"/>
+          </a:xfrm>
+          <a:prstGeom prst="rect">
+            <a:avLst/>
+          </a:prstGeom>
+          <a:noFill/>
+        </p:spPr>
+        <p:txBody>
+          <a:bodyPr wrap="square" rtlCol="0">
+            <a:spAutoFit/>
+          </a:bodyPr>
+          <a:lstStyle/>
+          <a:p>
+            <a:r>
+              <a:rPr lang="en-US" dirty="0"/>
+              <a:t>*</a:t>
+            </a:r>
+          </a:p>
+        </p:txBody>
+      </p:sp>
+      <p:sp>
+        <p:nvSpPr>
+          <p:cNvPr id="12" name="TextBox 11">
+            <a:extLst>
+              <a:ext uri="{FF2B5EF4-FFF2-40B4-BE49-F238E27FC236}">
+                <a16:creationId xmlns:a16="http://schemas.microsoft.com/office/drawing/2014/main" id="{5A9B235E-2751-4C38-823F-45B3207B613C}"/>
+              </a:ext>
+            </a:extLst>
+          </p:cNvPr>
+          <p:cNvSpPr txBox="1"/>
+          <p:nvPr/>
+        </p:nvSpPr>
+        <p:spPr>
+          <a:xfrm>
+            <a:off x="5786356" y="3376186"/>
+            <a:ext cx="512629" cy="307777"/>
+          </a:xfrm>
+          <a:prstGeom prst="rect">
+            <a:avLst/>
+          </a:prstGeom>
+          <a:noFill/>
+        </p:spPr>
+        <p:txBody>
+          <a:bodyPr wrap="square" rtlCol="0">
+            <a:spAutoFit/>
+          </a:bodyPr>
+          <a:lstStyle/>
+          <a:p>
+            <a:r>
+              <a:rPr lang="en-US" sz="1400" dirty="0"/>
+              <a:t>1</a:t>
+            </a:r>
+          </a:p>
+        </p:txBody>
+      </p:sp>
+      <p:cxnSp>
+        <p:nvCxnSpPr>
+          <p:cNvPr id="13" name="Straight Connector 12">
+            <a:extLst>
+              <a:ext uri="{FF2B5EF4-FFF2-40B4-BE49-F238E27FC236}">
+                <a16:creationId xmlns:a16="http://schemas.microsoft.com/office/drawing/2014/main" id="{9A4A53B0-9248-41D8-91AB-D90556541E1D}"/>
+              </a:ext>
+            </a:extLst>
+          </p:cNvPr>
+          <p:cNvCxnSpPr>
+            <a:cxnSpLocks/>
+            <a:endCxn id="5" idx="0"/>
+          </p:cNvCxnSpPr>
+          <p:nvPr/>
+        </p:nvCxnSpPr>
+        <p:spPr>
+          <a:xfrm>
+            <a:off x="6983609" y="2435148"/>
+            <a:ext cx="0" cy="993852"/>
+          </a:xfrm>
+          <a:prstGeom prst="line">
+            <a:avLst/>
+          </a:prstGeom>
+        </p:spPr>
+        <p:style>
+          <a:lnRef idx="1">
+            <a:schemeClr val="accent1"/>
+          </a:lnRef>
+          <a:fillRef idx="0">
+            <a:schemeClr val="accent1"/>
+          </a:fillRef>
+          <a:effectRef idx="0">
+            <a:schemeClr val="accent1"/>
+          </a:effectRef>
+          <a:fontRef idx="minor">
+            <a:schemeClr val="tx1"/>
+          </a:fontRef>
+        </p:style>
+      </p:cxnSp>
+      <p:sp>
+        <p:nvSpPr>
+          <p:cNvPr id="14" name="TextBox 13">
+            <a:extLst>
+              <a:ext uri="{FF2B5EF4-FFF2-40B4-BE49-F238E27FC236}">
+                <a16:creationId xmlns:a16="http://schemas.microsoft.com/office/drawing/2014/main" id="{64644274-E9CD-4190-8D0B-13AC2B55C3AB}"/>
+              </a:ext>
+            </a:extLst>
+          </p:cNvPr>
+          <p:cNvSpPr txBox="1"/>
+          <p:nvPr/>
+        </p:nvSpPr>
+        <p:spPr>
+          <a:xfrm>
+            <a:off x="6794956" y="3210610"/>
+            <a:ext cx="512629" cy="307777"/>
+          </a:xfrm>
+          <a:prstGeom prst="rect">
+            <a:avLst/>
+          </a:prstGeom>
+          <a:noFill/>
+        </p:spPr>
+        <p:txBody>
+          <a:bodyPr wrap="square" rtlCol="0">
+            <a:spAutoFit/>
+          </a:bodyPr>
+          <a:lstStyle/>
+          <a:p>
+            <a:r>
+              <a:rPr lang="en-US" sz="1400" dirty="0"/>
+              <a:t>1</a:t>
+            </a:r>
+          </a:p>
+        </p:txBody>
+      </p:sp>
+      <p:sp>
+        <p:nvSpPr>
+          <p:cNvPr id="16" name="TextBox 15">
+            <a:extLst>
+              <a:ext uri="{FF2B5EF4-FFF2-40B4-BE49-F238E27FC236}">
+                <a16:creationId xmlns:a16="http://schemas.microsoft.com/office/drawing/2014/main" id="{BEE14D3B-7B1B-4ED1-AFE5-4BA069D19FA0}"/>
+              </a:ext>
+            </a:extLst>
+          </p:cNvPr>
+          <p:cNvSpPr txBox="1"/>
+          <p:nvPr/>
+        </p:nvSpPr>
+        <p:spPr>
+          <a:xfrm>
+            <a:off x="6744926" y="2373644"/>
+            <a:ext cx="512629" cy="373487"/>
+          </a:xfrm>
+          <a:prstGeom prst="rect">
+            <a:avLst/>
+          </a:prstGeom>
+          <a:noFill/>
+        </p:spPr>
+        <p:txBody>
+          <a:bodyPr wrap="square" rtlCol="0">
+            <a:spAutoFit/>
+          </a:bodyPr>
+          <a:lstStyle/>
+          <a:p>
+            <a:r>
+              <a:rPr lang="en-US" dirty="0"/>
+              <a:t>*</a:t>
+            </a:r>
+          </a:p>
+        </p:txBody>
+      </p:sp>
+      <p:sp>
+        <p:nvSpPr>
+          <p:cNvPr id="17" name="TextBox 16">
+            <a:extLst>
+              <a:ext uri="{FF2B5EF4-FFF2-40B4-BE49-F238E27FC236}">
+                <a16:creationId xmlns:a16="http://schemas.microsoft.com/office/drawing/2014/main" id="{44D40C97-4B1B-4345-BE0A-14EC22F9EB58}"/>
+              </a:ext>
+            </a:extLst>
+          </p:cNvPr>
+          <p:cNvSpPr txBox="1"/>
+          <p:nvPr/>
+        </p:nvSpPr>
+        <p:spPr>
+          <a:xfrm>
+            <a:off x="8472346" y="1068110"/>
+            <a:ext cx="3499259" cy="276999"/>
+          </a:xfrm>
+          <a:prstGeom prst="rect">
+            <a:avLst/>
+          </a:prstGeom>
+          <a:noFill/>
+          <a:ln>
+            <a:solidFill>
+              <a:srgbClr val="FF0000"/>
+            </a:solidFill>
+          </a:ln>
+        </p:spPr>
+        <p:txBody>
+          <a:bodyPr wrap="square" rtlCol="0">
+            <a:spAutoFit/>
+          </a:bodyPr>
+          <a:lstStyle/>
+          <a:p>
+            <a:r>
+              <a:rPr lang="en-US" sz="1200" dirty="0"/>
+              <a:t>If role = student will add form to select student.</a:t>
+            </a:r>
+          </a:p>
+        </p:txBody>
+      </p:sp>
+      <p:sp>
+        <p:nvSpPr>
+          <p:cNvPr id="18" name="TextBox 17">
+            <a:extLst>
+              <a:ext uri="{FF2B5EF4-FFF2-40B4-BE49-F238E27FC236}">
+                <a16:creationId xmlns:a16="http://schemas.microsoft.com/office/drawing/2014/main" id="{C0D01474-F0FC-478B-B0F6-54279DF8B6A2}"/>
+              </a:ext>
+            </a:extLst>
+          </p:cNvPr>
+          <p:cNvSpPr txBox="1"/>
+          <p:nvPr/>
+        </p:nvSpPr>
+        <p:spPr>
+          <a:xfrm>
+            <a:off x="8501571" y="2823438"/>
+            <a:ext cx="3499259" cy="600164"/>
+          </a:xfrm>
+          <a:prstGeom prst="rect">
+            <a:avLst/>
+          </a:prstGeom>
+          <a:noFill/>
+          <a:ln>
+            <a:solidFill>
+              <a:srgbClr val="FF0000"/>
+            </a:solidFill>
+          </a:ln>
+        </p:spPr>
+        <p:txBody>
+          <a:bodyPr wrap="square" rtlCol="0">
+            <a:spAutoFit/>
+          </a:bodyPr>
+          <a:lstStyle/>
+          <a:p>
+            <a:r>
+              <a:rPr lang="en-US" sz="1100" dirty="0"/>
+              <a:t>-SA COORDINATOR can CRUD disciplines</a:t>
+            </a:r>
+          </a:p>
+          <a:p>
+            <a:r>
+              <a:rPr lang="en-US" sz="1100" dirty="0"/>
+              <a:t>-SA OFFICER can VIEW disciplines (not edit) </a:t>
+            </a:r>
+          </a:p>
+          <a:p>
+            <a:r>
+              <a:rPr lang="en-US" sz="1100" dirty="0"/>
+              <a:t>- STUDENT can VIEW only their own disciplines (not edit)</a:t>
+            </a:r>
+          </a:p>
+        </p:txBody>
+      </p:sp>
+      <p:sp>
+        <p:nvSpPr>
+          <p:cNvPr id="19" name="TextBox 18">
+            <a:extLst>
+              <a:ext uri="{FF2B5EF4-FFF2-40B4-BE49-F238E27FC236}">
+                <a16:creationId xmlns:a16="http://schemas.microsoft.com/office/drawing/2014/main" id="{FFF11AA1-095F-4ADA-B1A3-481768100238}"/>
+              </a:ext>
+            </a:extLst>
+          </p:cNvPr>
+          <p:cNvSpPr txBox="1"/>
+          <p:nvPr/>
+        </p:nvSpPr>
+        <p:spPr>
+          <a:xfrm>
+            <a:off x="8501571" y="1803305"/>
+            <a:ext cx="3499259" cy="430887"/>
+          </a:xfrm>
+          <a:prstGeom prst="rect">
+            <a:avLst/>
+          </a:prstGeom>
+          <a:noFill/>
+          <a:ln>
+            <a:solidFill>
+              <a:srgbClr val="FF0000"/>
+            </a:solidFill>
+          </a:ln>
+        </p:spPr>
+        <p:txBody>
+          <a:bodyPr wrap="square" rtlCol="0">
+            <a:spAutoFit/>
+          </a:bodyPr>
+          <a:lstStyle/>
+          <a:p>
+            <a:r>
+              <a:rPr lang="en-US" sz="1100" dirty="0"/>
+              <a:t>-SA OFFICER can CRUD permissions</a:t>
+            </a:r>
+          </a:p>
+          <a:p>
+            <a:r>
+              <a:rPr lang="en-US" sz="1100" dirty="0"/>
+              <a:t>- STUDENT can VIEW only their own permissions (not edit)</a:t>
+            </a:r>
+          </a:p>
+        </p:txBody>
+      </p:sp>
+      <p:sp>
+        <p:nvSpPr>
+          <p:cNvPr id="20" name="TextBox 19">
+            <a:extLst>
+              <a:ext uri="{FF2B5EF4-FFF2-40B4-BE49-F238E27FC236}">
+                <a16:creationId xmlns:a16="http://schemas.microsoft.com/office/drawing/2014/main" id="{AC1C1606-9379-40BE-938E-7C327BB129A9}"/>
+              </a:ext>
+            </a:extLst>
+          </p:cNvPr>
+          <p:cNvSpPr txBox="1"/>
+          <p:nvPr/>
+        </p:nvSpPr>
+        <p:spPr>
+          <a:xfrm>
+            <a:off x="9849245" y="814880"/>
+            <a:ext cx="803912" cy="307777"/>
+          </a:xfrm>
+          <a:prstGeom prst="rect">
+            <a:avLst/>
+          </a:prstGeom>
+          <a:noFill/>
+        </p:spPr>
+        <p:txBody>
+          <a:bodyPr wrap="square" rtlCol="0">
+            <a:spAutoFit/>
+          </a:bodyPr>
+          <a:lstStyle/>
+          <a:p>
+            <a:r>
+              <a:rPr lang="en-US" sz="1400" dirty="0">
+                <a:solidFill>
+                  <a:srgbClr val="00B050"/>
+                </a:solidFill>
+              </a:rPr>
+              <a:t>Users</a:t>
+            </a:r>
+          </a:p>
+        </p:txBody>
+      </p:sp>
+      <p:sp>
+        <p:nvSpPr>
+          <p:cNvPr id="21" name="TextBox 20">
+            <a:extLst>
+              <a:ext uri="{FF2B5EF4-FFF2-40B4-BE49-F238E27FC236}">
+                <a16:creationId xmlns:a16="http://schemas.microsoft.com/office/drawing/2014/main" id="{869A117A-0F9D-45D7-9941-50327833C99A}"/>
+              </a:ext>
+            </a:extLst>
+          </p:cNvPr>
+          <p:cNvSpPr txBox="1"/>
+          <p:nvPr/>
+        </p:nvSpPr>
+        <p:spPr>
+          <a:xfrm>
+            <a:off x="9717478" y="1518245"/>
+            <a:ext cx="1266474" cy="307777"/>
+          </a:xfrm>
+          <a:prstGeom prst="rect">
+            <a:avLst/>
+          </a:prstGeom>
+          <a:noFill/>
+        </p:spPr>
+        <p:txBody>
+          <a:bodyPr wrap="square" rtlCol="0">
+            <a:spAutoFit/>
+          </a:bodyPr>
+          <a:lstStyle/>
+          <a:p>
+            <a:r>
+              <a:rPr lang="en-US" sz="1400" dirty="0">
+                <a:solidFill>
+                  <a:srgbClr val="00B050"/>
+                </a:solidFill>
+              </a:rPr>
+              <a:t>Permissions</a:t>
+            </a:r>
+          </a:p>
+        </p:txBody>
+      </p:sp>
+      <p:sp>
+        <p:nvSpPr>
+          <p:cNvPr id="22" name="TextBox 21">
+            <a:extLst>
+              <a:ext uri="{FF2B5EF4-FFF2-40B4-BE49-F238E27FC236}">
+                <a16:creationId xmlns:a16="http://schemas.microsoft.com/office/drawing/2014/main" id="{ACF5E687-0BD6-4032-8A8E-D3B09A4B1DB2}"/>
+              </a:ext>
+            </a:extLst>
+          </p:cNvPr>
+          <p:cNvSpPr txBox="1"/>
+          <p:nvPr/>
+        </p:nvSpPr>
+        <p:spPr>
+          <a:xfrm>
+            <a:off x="9717478" y="1504368"/>
+            <a:ext cx="1266474" cy="307777"/>
+          </a:xfrm>
+          <a:prstGeom prst="rect">
+            <a:avLst/>
+          </a:prstGeom>
+          <a:noFill/>
+        </p:spPr>
+        <p:txBody>
+          <a:bodyPr wrap="square" rtlCol="0">
+            <a:spAutoFit/>
+          </a:bodyPr>
+          <a:lstStyle/>
+          <a:p>
+            <a:r>
+              <a:rPr lang="en-US" sz="1400" dirty="0">
+                <a:solidFill>
+                  <a:srgbClr val="00B050"/>
+                </a:solidFill>
+              </a:rPr>
+              <a:t>Permissions</a:t>
+            </a:r>
+          </a:p>
+        </p:txBody>
+      </p:sp>
+      <p:sp>
+        <p:nvSpPr>
+          <p:cNvPr id="23" name="TextBox 22">
+            <a:extLst>
+              <a:ext uri="{FF2B5EF4-FFF2-40B4-BE49-F238E27FC236}">
+                <a16:creationId xmlns:a16="http://schemas.microsoft.com/office/drawing/2014/main" id="{57D417E5-3806-4915-A7C9-373F8FDE8D31}"/>
+              </a:ext>
+            </a:extLst>
+          </p:cNvPr>
+          <p:cNvSpPr txBox="1"/>
+          <p:nvPr/>
+        </p:nvSpPr>
+        <p:spPr>
+          <a:xfrm>
+            <a:off x="9849245" y="2515661"/>
+            <a:ext cx="953392" cy="307777"/>
+          </a:xfrm>
+          <a:prstGeom prst="rect">
+            <a:avLst/>
+          </a:prstGeom>
+          <a:noFill/>
+        </p:spPr>
+        <p:txBody>
+          <a:bodyPr wrap="square" rtlCol="0">
+            <a:spAutoFit/>
+          </a:bodyPr>
+          <a:lstStyle/>
+          <a:p>
+            <a:r>
+              <a:rPr lang="en-US" sz="1400" dirty="0">
+                <a:solidFill>
+                  <a:srgbClr val="00B050"/>
+                </a:solidFill>
+              </a:rPr>
+              <a:t>Disciple</a:t>
+            </a:r>
+          </a:p>
+        </p:txBody>
+      </p:sp>
+      <p:cxnSp>
+        <p:nvCxnSpPr>
+          <p:cNvPr id="24" name="Straight Connector 23">
+            <a:extLst>
+              <a:ext uri="{FF2B5EF4-FFF2-40B4-BE49-F238E27FC236}">
+                <a16:creationId xmlns:a16="http://schemas.microsoft.com/office/drawing/2014/main" id="{52670465-134E-45C2-BCD6-FA02DCBCB864}"/>
+              </a:ext>
+            </a:extLst>
+          </p:cNvPr>
+          <p:cNvCxnSpPr>
+            <a:cxnSpLocks/>
+          </p:cNvCxnSpPr>
+          <p:nvPr/>
+        </p:nvCxnSpPr>
+        <p:spPr>
+          <a:xfrm>
+            <a:off x="3836007" y="4555564"/>
+            <a:ext cx="2140060" cy="16436"/>
+          </a:xfrm>
+          <a:prstGeom prst="line">
+            <a:avLst/>
+          </a:prstGeom>
+        </p:spPr>
+        <p:style>
+          <a:lnRef idx="1">
+            <a:schemeClr val="accent1"/>
+          </a:lnRef>
+          <a:fillRef idx="0">
+            <a:schemeClr val="accent1"/>
+          </a:fillRef>
+          <a:effectRef idx="0">
+            <a:schemeClr val="accent1"/>
+          </a:effectRef>
+          <a:fontRef idx="minor">
+            <a:schemeClr val="tx1"/>
+          </a:fontRef>
+        </p:style>
+      </p:cxnSp>
+      <p:sp>
+        <p:nvSpPr>
+          <p:cNvPr id="25" name="TextBox 24">
+            <a:extLst>
+              <a:ext uri="{FF2B5EF4-FFF2-40B4-BE49-F238E27FC236}">
+                <a16:creationId xmlns:a16="http://schemas.microsoft.com/office/drawing/2014/main" id="{296BADF4-A1E8-444D-A120-251CE9C74188}"/>
+              </a:ext>
+            </a:extLst>
+          </p:cNvPr>
+          <p:cNvSpPr txBox="1"/>
+          <p:nvPr/>
+        </p:nvSpPr>
+        <p:spPr>
+          <a:xfrm>
+            <a:off x="3704667" y="4368820"/>
+            <a:ext cx="512629" cy="373487"/>
+          </a:xfrm>
+          <a:prstGeom prst="rect">
+            <a:avLst/>
+          </a:prstGeom>
+          <a:noFill/>
+        </p:spPr>
+        <p:txBody>
+          <a:bodyPr wrap="square" rtlCol="0">
+            <a:spAutoFit/>
+          </a:bodyPr>
+          <a:lstStyle/>
+          <a:p>
+            <a:r>
+              <a:rPr lang="en-US" dirty="0"/>
+              <a:t>*</a:t>
+            </a:r>
+          </a:p>
+        </p:txBody>
+      </p:sp>
+      <p:sp>
+        <p:nvSpPr>
+          <p:cNvPr id="26" name="TextBox 25">
+            <a:extLst>
+              <a:ext uri="{FF2B5EF4-FFF2-40B4-BE49-F238E27FC236}">
+                <a16:creationId xmlns:a16="http://schemas.microsoft.com/office/drawing/2014/main" id="{4567042D-80DA-4714-8A98-3BA2A6965940}"/>
+              </a:ext>
+            </a:extLst>
+          </p:cNvPr>
+          <p:cNvSpPr txBox="1"/>
+          <p:nvPr/>
+        </p:nvSpPr>
+        <p:spPr>
+          <a:xfrm>
+            <a:off x="5761495" y="4313623"/>
+            <a:ext cx="512629" cy="307777"/>
+          </a:xfrm>
+          <a:prstGeom prst="rect">
+            <a:avLst/>
+          </a:prstGeom>
+          <a:noFill/>
+        </p:spPr>
+        <p:txBody>
+          <a:bodyPr wrap="square" rtlCol="0">
+            <a:spAutoFit/>
+          </a:bodyPr>
+          <a:lstStyle/>
+          <a:p>
+            <a:r>
+              <a:rPr lang="en-US" sz="1400" dirty="0"/>
+              <a:t>1</a:t>
+            </a:r>
+          </a:p>
+        </p:txBody>
+      </p:sp>
     </p:spTree>
     <p:extLst>
       <p:ext uri="{BB962C8B-B14F-4D97-AF65-F5344CB8AC3E}">

</xml_diff>